<commit_message>
automatic commit via GraphicsPublisher bot
</commit_message>
<xml_diff>
--- a/content/courses/graphics/make-a-monster/promo.pptx
+++ b/content/courses/graphics/make-a-monster/promo.pptx
@@ -3104,7 +3104,7 @@
           <a:lstStyle/>
           <a:p>
             <a:r>
-              <a:t>Make a Monster</a:t>
+              <a:t>make-a-monster</a:t>
             </a:r>
           </a:p>
         </p:txBody>
@@ -3125,7 +3125,7 @@
           <a:lstStyle/>
           <a:p>
             <a:r>
-              <a:t>See more at https://trojancs.org/courses/graphics/Make a Monster/</a:t>
+              <a:t>See more at https://trojancs.org/courses/graphics/make-a-monster/</a:t>
             </a:r>
           </a:p>
         </p:txBody>
@@ -3156,7 +3156,7 @@
       </p:pic>
       <p:pic>
         <p:nvPicPr>
-          <p:cNvPr id="5" name="Picture 4" descr="thumb_8c71d998-044d-11ec-a753-1e00f30e0089.png"/>
+          <p:cNvPr id="5" name="Picture 4" descr="thumb_155b0104-0452-11ec-8377-1e00f30e0089.png"/>
           <p:cNvPicPr>
             <a:picLocks noChangeAspect="1"/>
           </p:cNvPicPr>
@@ -3180,7 +3180,7 @@
       </p:pic>
       <p:pic>
         <p:nvPicPr>
-          <p:cNvPr id="6" name="Picture 5" descr="thumb_8d0e7050-044d-11ec-a753-1e00f30e0089.png"/>
+          <p:cNvPr id="6" name="Picture 5" descr="thumb_1563c528-0452-11ec-8377-1e00f30e0089.png"/>
           <p:cNvPicPr>
             <a:picLocks noChangeAspect="1"/>
           </p:cNvPicPr>
@@ -3194,7 +3194,7 @@
         </p:blipFill>
         <p:spPr>
           <a:xfrm>
-            <a:off x="481263" y="2571750"/>
+            <a:off x="457200" y="2571750"/>
             <a:ext cx="1285875" cy="160734375"/>
           </a:xfrm>
           <a:prstGeom prst="rect">
@@ -3204,7 +3204,7 @@
       </p:pic>
       <p:pic>
         <p:nvPicPr>
-          <p:cNvPr id="7" name="Picture 6" descr="thumb_8dee3c76-044d-11ec-a753-1e00f30e0089.png"/>
+          <p:cNvPr id="7" name="Picture 6" descr="thumb_165b622e-0452-11ec-8377-1e00f30e0089.png"/>
           <p:cNvPicPr>
             <a:picLocks noChangeAspect="1"/>
           </p:cNvPicPr>
@@ -3218,7 +3218,7 @@
         </p:blipFill>
         <p:spPr>
           <a:xfrm>
-            <a:off x="962526" y="2571750"/>
+            <a:off x="914400" y="2571750"/>
             <a:ext cx="1285875" cy="1236418"/>
           </a:xfrm>
           <a:prstGeom prst="rect">
@@ -3228,7 +3228,7 @@
       </p:pic>
       <p:pic>
         <p:nvPicPr>
-          <p:cNvPr id="8" name="Picture 7" descr="thumb_8df69d6c-044d-11ec-a753-1e00f30e0089.png"/>
+          <p:cNvPr id="8" name="Picture 7" descr="thumb_1663dc2e-0452-11ec-8377-1e00f30e0089.png"/>
           <p:cNvPicPr>
             <a:picLocks noChangeAspect="1"/>
           </p:cNvPicPr>
@@ -3242,7 +3242,7 @@
         </p:blipFill>
         <p:spPr>
           <a:xfrm>
-            <a:off x="1443789" y="2571750"/>
+            <a:off x="1371600" y="2571750"/>
             <a:ext cx="1285875" cy="1285875"/>
           </a:xfrm>
           <a:prstGeom prst="rect">
@@ -3252,7 +3252,7 @@
       </p:pic>
       <p:pic>
         <p:nvPicPr>
-          <p:cNvPr id="9" name="Picture 8" descr="thumb_8dfbc0d0-044d-11ec-a753-1e00f30e0089.png"/>
+          <p:cNvPr id="9" name="Picture 8" descr="thumb_16675cb4-0452-11ec-8377-1e00f30e0089.png"/>
           <p:cNvPicPr>
             <a:picLocks noChangeAspect="1"/>
           </p:cNvPicPr>
@@ -3266,7 +3266,7 @@
         </p:blipFill>
         <p:spPr>
           <a:xfrm>
-            <a:off x="1925052" y="2571750"/>
+            <a:off x="1828800" y="2571750"/>
             <a:ext cx="1285875" cy="964406"/>
           </a:xfrm>
           <a:prstGeom prst="rect">
@@ -3276,7 +3276,7 @@
       </p:pic>
       <p:pic>
         <p:nvPicPr>
-          <p:cNvPr id="10" name="Picture 9" descr="thumb_8e35426a-044d-11ec-a753-1e00f30e0089.png"/>
+          <p:cNvPr id="10" name="Picture 9" descr="thumb_17362904-0452-11ec-8377-1e00f30e0089.png"/>
           <p:cNvPicPr>
             <a:picLocks noChangeAspect="1"/>
           </p:cNvPicPr>
@@ -3290,7 +3290,7 @@
         </p:blipFill>
         <p:spPr>
           <a:xfrm>
-            <a:off x="2406315" y="2571750"/>
+            <a:off x="2286000" y="2571750"/>
             <a:ext cx="1285875" cy="964406"/>
           </a:xfrm>
           <a:prstGeom prst="rect">
@@ -3300,7 +3300,7 @@
       </p:pic>
       <p:pic>
         <p:nvPicPr>
-          <p:cNvPr id="11" name="Picture 10" descr="thumb_8e37b0ea-044d-11ec-a753-1e00f30e0089.png"/>
+          <p:cNvPr id="11" name="Picture 10" descr="thumb_173aafe2-0452-11ec-8377-1e00f30e0089.png"/>
           <p:cNvPicPr>
             <a:picLocks noChangeAspect="1"/>
           </p:cNvPicPr>
@@ -3314,7 +3314,7 @@
         </p:blipFill>
         <p:spPr>
           <a:xfrm>
-            <a:off x="2887578" y="2571750"/>
+            <a:off x="2743200" y="2571750"/>
             <a:ext cx="1285875" cy="1285875"/>
           </a:xfrm>
           <a:prstGeom prst="rect">
@@ -3324,7 +3324,7 @@
       </p:pic>
       <p:pic>
         <p:nvPicPr>
-          <p:cNvPr id="12" name="Picture 11" descr="thumb_8e3a77c6-044d-11ec-a753-1e00f30e0089.png"/>
+          <p:cNvPr id="12" name="Picture 11" descr="thumb_173d5468-0452-11ec-8377-1e00f30e0089.png"/>
           <p:cNvPicPr>
             <a:picLocks noChangeAspect="1"/>
           </p:cNvPicPr>
@@ -3338,7 +3338,7 @@
         </p:blipFill>
         <p:spPr>
           <a:xfrm>
-            <a:off x="3368842" y="2571750"/>
+            <a:off x="3200400" y="2571750"/>
             <a:ext cx="1285875" cy="1285875"/>
           </a:xfrm>
           <a:prstGeom prst="rect">
@@ -3348,7 +3348,7 @@
       </p:pic>
       <p:pic>
         <p:nvPicPr>
-          <p:cNvPr id="13" name="Picture 12" descr="thumb_8e3e22a4-044d-11ec-a753-1e00f30e0089.png"/>
+          <p:cNvPr id="13" name="Picture 12" descr="thumb_17410086-0452-11ec-8377-1e00f30e0089.png"/>
           <p:cNvPicPr>
             <a:picLocks noChangeAspect="1"/>
           </p:cNvPicPr>
@@ -3362,7 +3362,7 @@
         </p:blipFill>
         <p:spPr>
           <a:xfrm>
-            <a:off x="3850105" y="2571750"/>
+            <a:off x="3657600" y="2571750"/>
             <a:ext cx="1285875" cy="964406"/>
           </a:xfrm>
           <a:prstGeom prst="rect">
@@ -3372,7 +3372,7 @@
       </p:pic>
       <p:pic>
         <p:nvPicPr>
-          <p:cNvPr id="14" name="Picture 13" descr="thumb_8e418408-044d-11ec-a753-1e00f30e0089.png"/>
+          <p:cNvPr id="14" name="Picture 13" descr="thumb_174464c4-0452-11ec-8377-1e00f30e0089.png"/>
           <p:cNvPicPr>
             <a:picLocks noChangeAspect="1"/>
           </p:cNvPicPr>
@@ -3386,7 +3386,7 @@
         </p:blipFill>
         <p:spPr>
           <a:xfrm>
-            <a:off x="4331368" y="2571750"/>
+            <a:off x="4114800" y="2571750"/>
             <a:ext cx="1285875" cy="1285875"/>
           </a:xfrm>
           <a:prstGeom prst="rect">
@@ -3396,7 +3396,7 @@
       </p:pic>
       <p:pic>
         <p:nvPicPr>
-          <p:cNvPr id="15" name="Picture 14" descr="thumb_8e451afa-044d-11ec-a753-1e00f30e0089.png"/>
+          <p:cNvPr id="15" name="Picture 14" descr="thumb_17480a48-0452-11ec-8377-1e00f30e0089.png"/>
           <p:cNvPicPr>
             <a:picLocks noChangeAspect="1"/>
           </p:cNvPicPr>
@@ -3410,7 +3410,7 @@
         </p:blipFill>
         <p:spPr>
           <a:xfrm>
-            <a:off x="4812631" y="2571750"/>
+            <a:off x="4572000" y="2571750"/>
             <a:ext cx="1285875" cy="964406"/>
           </a:xfrm>
           <a:prstGeom prst="rect">
@@ -3420,7 +3420,7 @@
       </p:pic>
       <p:pic>
         <p:nvPicPr>
-          <p:cNvPr id="16" name="Picture 15" descr="thumb_8e486a3e-044d-11ec-a753-1e00f30e0089.png"/>
+          <p:cNvPr id="16" name="Picture 15" descr="thumb_174b5cfc-0452-11ec-8377-1e00f30e0089.png"/>
           <p:cNvPicPr>
             <a:picLocks noChangeAspect="1"/>
           </p:cNvPicPr>
@@ -3434,7 +3434,7 @@
         </p:blipFill>
         <p:spPr>
           <a:xfrm>
-            <a:off x="5293894" y="2571750"/>
+            <a:off x="5029200" y="2571750"/>
             <a:ext cx="1285875" cy="964406"/>
           </a:xfrm>
           <a:prstGeom prst="rect">
@@ -3444,7 +3444,7 @@
       </p:pic>
       <p:pic>
         <p:nvPicPr>
-          <p:cNvPr id="17" name="Picture 16" descr="thumb_8e4bd94e-044d-11ec-a753-1e00f30e0089.png"/>
+          <p:cNvPr id="17" name="Picture 16" descr="thumb_174eb708-0452-11ec-8377-1e00f30e0089.png"/>
           <p:cNvPicPr>
             <a:picLocks noChangeAspect="1"/>
           </p:cNvPicPr>
@@ -3458,7 +3458,7 @@
         </p:blipFill>
         <p:spPr>
           <a:xfrm>
-            <a:off x="5775157" y="2571750"/>
+            <a:off x="5486400" y="2571750"/>
             <a:ext cx="1285875" cy="1141309"/>
           </a:xfrm>
           <a:prstGeom prst="rect">
@@ -3468,7 +3468,7 @@
       </p:pic>
       <p:pic>
         <p:nvPicPr>
-          <p:cNvPr id="18" name="Picture 17" descr="thumb_8e4fca9a-044d-11ec-a753-1e00f30e0089.png"/>
+          <p:cNvPr id="18" name="Picture 17" descr="thumb_1752729e-0452-11ec-8377-1e00f30e0089.png"/>
           <p:cNvPicPr>
             <a:picLocks noChangeAspect="1"/>
           </p:cNvPicPr>
@@ -3482,7 +3482,7 @@
         </p:blipFill>
         <p:spPr>
           <a:xfrm>
-            <a:off x="6256421" y="2571750"/>
+            <a:off x="5943600" y="2571750"/>
             <a:ext cx="1285875" cy="964406"/>
           </a:xfrm>
           <a:prstGeom prst="rect">
@@ -3492,7 +3492,7 @@
       </p:pic>
       <p:pic>
         <p:nvPicPr>
-          <p:cNvPr id="19" name="Picture 18" descr="thumb_8e5328ca-044d-11ec-a753-1e00f30e0089.png"/>
+          <p:cNvPr id="19" name="Picture 18" descr="thumb_1755cae8-0452-11ec-8377-1e00f30e0089.png"/>
           <p:cNvPicPr>
             <a:picLocks noChangeAspect="1"/>
           </p:cNvPicPr>
@@ -3506,7 +3506,7 @@
         </p:blipFill>
         <p:spPr>
           <a:xfrm>
-            <a:off x="6737684" y="2571750"/>
+            <a:off x="6400800" y="2571750"/>
             <a:ext cx="1285875" cy="964406"/>
           </a:xfrm>
           <a:prstGeom prst="rect">
@@ -3516,7 +3516,7 @@
       </p:pic>
       <p:pic>
         <p:nvPicPr>
-          <p:cNvPr id="20" name="Picture 19" descr="thumb_8e56843e-044d-11ec-a753-1e00f30e0089.png"/>
+          <p:cNvPr id="20" name="Picture 19" descr="thumb_17591806-0452-11ec-8377-1e00f30e0089.png"/>
           <p:cNvPicPr>
             <a:picLocks noChangeAspect="1"/>
           </p:cNvPicPr>
@@ -3530,7 +3530,7 @@
         </p:blipFill>
         <p:spPr>
           <a:xfrm>
-            <a:off x="7218947" y="2571750"/>
+            <a:off x="6858000" y="2571750"/>
             <a:ext cx="1285875" cy="1285875"/>
           </a:xfrm>
           <a:prstGeom prst="rect">
@@ -3540,7 +3540,7 @@
       </p:pic>
       <p:pic>
         <p:nvPicPr>
-          <p:cNvPr id="21" name="Picture 20" descr="thumb_8e5a17d4-044d-11ec-a753-1e00f30e0089.png"/>
+          <p:cNvPr id="21" name="Picture 20" descr="thumb_175c8a40-0452-11ec-8377-1e00f30e0089.png"/>
           <p:cNvPicPr>
             <a:picLocks noChangeAspect="1"/>
           </p:cNvPicPr>
@@ -3554,7 +3554,7 @@
         </p:blipFill>
         <p:spPr>
           <a:xfrm>
-            <a:off x="7700210" y="2571750"/>
+            <a:off x="7315200" y="2571750"/>
             <a:ext cx="1285875" cy="1285875"/>
           </a:xfrm>
           <a:prstGeom prst="rect">
@@ -3564,7 +3564,7 @@
       </p:pic>
       <p:pic>
         <p:nvPicPr>
-          <p:cNvPr id="22" name="Picture 21" descr="thumb_8e5db092-044d-11ec-a753-1e00f30e0089.png"/>
+          <p:cNvPr id="22" name="Picture 21" descr="thumb_176000d0-0452-11ec-8377-1e00f30e0089.png"/>
           <p:cNvPicPr>
             <a:picLocks noChangeAspect="1"/>
           </p:cNvPicPr>
@@ -3578,7 +3578,7 @@
         </p:blipFill>
         <p:spPr>
           <a:xfrm>
-            <a:off x="8181473" y="2571750"/>
+            <a:off x="7772400" y="2571750"/>
             <a:ext cx="1285875" cy="1154978"/>
           </a:xfrm>
           <a:prstGeom prst="rect">
@@ -3588,7 +3588,7 @@
       </p:pic>
       <p:pic>
         <p:nvPicPr>
-          <p:cNvPr id="23" name="Picture 22" descr="thumb_8e6ef37a-044d-11ec-a753-1e00f30e0089.png"/>
+          <p:cNvPr id="23" name="Picture 22" descr="thumb_177147aa-0452-11ec-8377-1e00f30e0089.png"/>
           <p:cNvPicPr>
             <a:picLocks noChangeAspect="1"/>
           </p:cNvPicPr>
@@ -3602,7 +3602,31 @@
         </p:blipFill>
         <p:spPr>
           <a:xfrm>
-            <a:off x="8662736" y="2571750"/>
+            <a:off x="8229600" y="2571750"/>
+            <a:ext cx="1285875" cy="1285875"/>
+          </a:xfrm>
+          <a:prstGeom prst="rect">
+            <a:avLst/>
+          </a:prstGeom>
+        </p:spPr>
+      </p:pic>
+      <p:pic>
+        <p:nvPicPr>
+          <p:cNvPr id="24" name="Picture 23" descr="thumb_1907ff3c-0452-11ec-8377-1e00f30e0089.png"/>
+          <p:cNvPicPr>
+            <a:picLocks noChangeAspect="1"/>
+          </p:cNvPicPr>
+          <p:nvPr/>
+        </p:nvPicPr>
+        <p:blipFill>
+          <a:blip r:embed="rId22"/>
+          <a:stretch>
+            <a:fillRect/>
+          </a:stretch>
+        </p:blipFill>
+        <p:spPr>
+          <a:xfrm>
+            <a:off x="8686800" y="2571750"/>
             <a:ext cx="1285875" cy="1285875"/>
           </a:xfrm>
           <a:prstGeom prst="rect">

</xml_diff>